<commit_message>
subiendo la documentación del proyecto
</commit_message>
<xml_diff>
--- a/docs/trim1/1_gestion_proyecto/1_presentacion_proyecto.pptx
+++ b/docs/trim1/1_gestion_proyecto/1_presentacion_proyecto.pptx
@@ -3786,7 +3786,7 @@
         </p:nvSpPr>
         <p:spPr>
           <a:xfrm>
-            <a:off x="1767792" y="1028701"/>
+            <a:off x="1767792" y="995145"/>
             <a:ext cx="2880000" cy="2077492"/>
           </a:xfrm>
           <a:prstGeom prst="rect">
@@ -4193,8 +4193,8 @@
         </p:nvSpPr>
         <p:spPr>
           <a:xfrm>
-            <a:off x="1767792" y="3160287"/>
-            <a:ext cx="2880000" cy="1717393"/>
+            <a:off x="1767792" y="3126731"/>
+            <a:ext cx="2880000" cy="1878976"/>
           </a:xfrm>
           <a:prstGeom prst="rect">
             <a:avLst/>
@@ -4335,6 +4335,23 @@
                 </a:solidFill>
               </a:rPr>
               <a:t>DML</a:t>
+            </a:r>
+          </a:p>
+          <a:p>
+            <a:pPr marL="444500" indent="-285750">
+              <a:buFont typeface="Arial" panose="020B0604020202020204" pitchFamily="34" charset="0"/>
+              <a:buChar char="•"/>
+            </a:pPr>
+            <a:r>
+              <a:rPr lang="es-ES" sz="1050" dirty="0" smtClean="0">
+                <a:solidFill>
+                  <a:schemeClr val="tx1">
+                    <a:lumMod val="75000"/>
+                    <a:lumOff val="25000"/>
+                  </a:schemeClr>
+                </a:solidFill>
+              </a:rPr>
+              <a:t>Automatización de la BBDD</a:t>
             </a:r>
             <a:endParaRPr lang="es-ES" sz="1050" dirty="0">
               <a:solidFill>

</xml_diff>